<commit_message>
Added mobile, updated documentation
</commit_message>
<xml_diff>
--- a/doc/documentation/images/abhaengigkeiten_projekte.pptx
+++ b/doc/documentation/images/abhaengigkeiten_projekte.pptx
@@ -3103,7 +3103,7 @@
         </p:nvSpPr>
         <p:spPr>
           <a:xfrm>
-            <a:off x="944576" y="881686"/>
+            <a:off x="1149436" y="881686"/>
             <a:ext cx="1374878" cy="293896"/>
           </a:xfrm>
           <a:prstGeom prst="roundRect">
@@ -3164,7 +3164,7 @@
         </p:nvSpPr>
         <p:spPr>
           <a:xfrm>
-            <a:off x="944576" y="1621878"/>
+            <a:off x="1962615" y="1621878"/>
             <a:ext cx="1374878" cy="293896"/>
           </a:xfrm>
           <a:prstGeom prst="roundRect">
@@ -3225,7 +3225,7 @@
         </p:nvSpPr>
         <p:spPr>
           <a:xfrm>
-            <a:off x="944576" y="2446038"/>
+            <a:off x="1170729" y="2299090"/>
             <a:ext cx="1374878" cy="293896"/>
           </a:xfrm>
           <a:prstGeom prst="roundRect">
@@ -3408,7 +3408,7 @@
         </p:nvSpPr>
         <p:spPr>
           <a:xfrm>
-            <a:off x="1962615" y="3135104"/>
+            <a:off x="2014451" y="3027030"/>
             <a:ext cx="2240958" cy="293896"/>
           </a:xfrm>
           <a:prstGeom prst="roundRect">
@@ -3469,7 +3469,7 @@
         </p:nvSpPr>
         <p:spPr>
           <a:xfrm>
-            <a:off x="3668316" y="2446038"/>
+            <a:off x="3668316" y="2299090"/>
             <a:ext cx="1374878" cy="293896"/>
           </a:xfrm>
           <a:prstGeom prst="roundRect">
@@ -3522,6 +3522,390 @@
           </a:p>
         </p:txBody>
       </p:sp>
+      <p:sp>
+        <p:nvSpPr>
+          <p:cNvPr id="11" name="Abgerundetes Rechteck 10"/>
+          <p:cNvSpPr/>
+          <p:nvPr/>
+        </p:nvSpPr>
+        <p:spPr>
+          <a:xfrm>
+            <a:off x="228988" y="1627330"/>
+            <a:ext cx="1519433" cy="288444"/>
+          </a:xfrm>
+          <a:prstGeom prst="roundRect">
+            <a:avLst/>
+          </a:prstGeom>
+          <a:noFill/>
+          <a:ln>
+            <a:solidFill>
+              <a:schemeClr val="tx1"/>
+            </a:solidFill>
+          </a:ln>
+          <a:effectLst/>
+        </p:spPr>
+        <p:style>
+          <a:lnRef idx="1">
+            <a:schemeClr val="accent1"/>
+          </a:lnRef>
+          <a:fillRef idx="3">
+            <a:schemeClr val="accent1"/>
+          </a:fillRef>
+          <a:effectRef idx="2">
+            <a:schemeClr val="accent1"/>
+          </a:effectRef>
+          <a:fontRef idx="minor">
+            <a:schemeClr val="lt1"/>
+          </a:fontRef>
+        </p:style>
+        <p:txBody>
+          <a:bodyPr rtlCol="0" anchor="ctr"/>
+          <a:lstStyle/>
+          <a:p>
+            <a:pPr algn="ctr"/>
+            <a:r>
+              <a:rPr lang="de-DE" sz="1000" dirty="0" err="1" smtClean="0">
+                <a:solidFill>
+                  <a:schemeClr val="tx1"/>
+                </a:solidFill>
+                <a:latin typeface="Hack"/>
+                <a:cs typeface="Hack"/>
+              </a:rPr>
+              <a:t>rendering_jmonkey</a:t>
+            </a:r>
+            <a:endParaRPr lang="de-DE" sz="1000" dirty="0">
+              <a:solidFill>
+                <a:schemeClr val="tx1"/>
+              </a:solidFill>
+              <a:latin typeface="Hack"/>
+              <a:cs typeface="Hack"/>
+            </a:endParaRPr>
+          </a:p>
+        </p:txBody>
+      </p:sp>
+      <p:cxnSp>
+        <p:nvCxnSpPr>
+          <p:cNvPr id="3" name="Gerade Verbindung mit Pfeil 2"/>
+          <p:cNvCxnSpPr>
+            <a:stCxn id="11" idx="0"/>
+          </p:cNvCxnSpPr>
+          <p:nvPr/>
+        </p:nvCxnSpPr>
+        <p:spPr>
+          <a:xfrm flipV="1">
+            <a:off x="988705" y="1175582"/>
+            <a:ext cx="400689" cy="451748"/>
+          </a:xfrm>
+          <a:prstGeom prst="straightConnector1">
+            <a:avLst/>
+          </a:prstGeom>
+          <a:ln w="12700" cmpd="sng">
+            <a:solidFill>
+              <a:schemeClr val="tx1"/>
+            </a:solidFill>
+            <a:headEnd type="none"/>
+            <a:tailEnd type="triangle"/>
+          </a:ln>
+          <a:effectLst/>
+        </p:spPr>
+        <p:style>
+          <a:lnRef idx="2">
+            <a:schemeClr val="accent1"/>
+          </a:lnRef>
+          <a:fillRef idx="0">
+            <a:schemeClr val="accent1"/>
+          </a:fillRef>
+          <a:effectRef idx="1">
+            <a:schemeClr val="accent1"/>
+          </a:effectRef>
+          <a:fontRef idx="minor">
+            <a:schemeClr val="tx1"/>
+          </a:fontRef>
+        </p:style>
+      </p:cxnSp>
+      <p:cxnSp>
+        <p:nvCxnSpPr>
+          <p:cNvPr id="18" name="Gerade Verbindung mit Pfeil 17"/>
+          <p:cNvCxnSpPr>
+            <a:stCxn id="5" idx="0"/>
+          </p:cNvCxnSpPr>
+          <p:nvPr/>
+        </p:nvCxnSpPr>
+        <p:spPr>
+          <a:xfrm flipH="1" flipV="1">
+            <a:off x="2156543" y="1175582"/>
+            <a:ext cx="493511" cy="446296"/>
+          </a:xfrm>
+          <a:prstGeom prst="straightConnector1">
+            <a:avLst/>
+          </a:prstGeom>
+          <a:ln w="12700" cmpd="sng">
+            <a:solidFill>
+              <a:schemeClr val="tx1"/>
+            </a:solidFill>
+            <a:headEnd type="none"/>
+            <a:tailEnd type="triangle"/>
+          </a:ln>
+          <a:effectLst/>
+        </p:spPr>
+        <p:style>
+          <a:lnRef idx="2">
+            <a:schemeClr val="accent1"/>
+          </a:lnRef>
+          <a:fillRef idx="0">
+            <a:schemeClr val="accent1"/>
+          </a:fillRef>
+          <a:effectRef idx="1">
+            <a:schemeClr val="accent1"/>
+          </a:effectRef>
+          <a:fontRef idx="minor">
+            <a:schemeClr val="tx1"/>
+          </a:fontRef>
+        </p:style>
+      </p:cxnSp>
+      <p:cxnSp>
+        <p:nvCxnSpPr>
+          <p:cNvPr id="21" name="Gerade Verbindung mit Pfeil 20"/>
+          <p:cNvCxnSpPr>
+            <a:stCxn id="6" idx="0"/>
+          </p:cNvCxnSpPr>
+          <p:nvPr/>
+        </p:nvCxnSpPr>
+        <p:spPr>
+          <a:xfrm flipH="1" flipV="1">
+            <a:off x="1389394" y="1921226"/>
+            <a:ext cx="468774" cy="377864"/>
+          </a:xfrm>
+          <a:prstGeom prst="straightConnector1">
+            <a:avLst/>
+          </a:prstGeom>
+          <a:ln w="12700" cmpd="sng">
+            <a:solidFill>
+              <a:schemeClr val="tx1"/>
+            </a:solidFill>
+            <a:headEnd type="none"/>
+            <a:tailEnd type="triangle"/>
+          </a:ln>
+          <a:effectLst/>
+        </p:spPr>
+        <p:style>
+          <a:lnRef idx="2">
+            <a:schemeClr val="accent1"/>
+          </a:lnRef>
+          <a:fillRef idx="0">
+            <a:schemeClr val="accent1"/>
+          </a:fillRef>
+          <a:effectRef idx="1">
+            <a:schemeClr val="accent1"/>
+          </a:effectRef>
+          <a:fontRef idx="minor">
+            <a:schemeClr val="tx1"/>
+          </a:fontRef>
+        </p:style>
+      </p:cxnSp>
+      <p:cxnSp>
+        <p:nvCxnSpPr>
+          <p:cNvPr id="24" name="Gerade Verbindung mit Pfeil 23"/>
+          <p:cNvCxnSpPr>
+            <a:stCxn id="6" idx="0"/>
+          </p:cNvCxnSpPr>
+          <p:nvPr/>
+        </p:nvCxnSpPr>
+        <p:spPr>
+          <a:xfrm flipV="1">
+            <a:off x="1858168" y="1915774"/>
+            <a:ext cx="443282" cy="383316"/>
+          </a:xfrm>
+          <a:prstGeom prst="straightConnector1">
+            <a:avLst/>
+          </a:prstGeom>
+          <a:ln w="12700" cmpd="sng">
+            <a:solidFill>
+              <a:schemeClr val="tx1"/>
+            </a:solidFill>
+            <a:headEnd type="none"/>
+            <a:tailEnd type="triangle"/>
+          </a:ln>
+          <a:effectLst/>
+        </p:spPr>
+        <p:style>
+          <a:lnRef idx="2">
+            <a:schemeClr val="accent1"/>
+          </a:lnRef>
+          <a:fillRef idx="0">
+            <a:schemeClr val="accent1"/>
+          </a:fillRef>
+          <a:effectRef idx="1">
+            <a:schemeClr val="accent1"/>
+          </a:effectRef>
+          <a:fontRef idx="minor">
+            <a:schemeClr val="tx1"/>
+          </a:fontRef>
+        </p:style>
+      </p:cxnSp>
+      <p:cxnSp>
+        <p:nvCxnSpPr>
+          <p:cNvPr id="27" name="Gerade Verbindung mit Pfeil 26"/>
+          <p:cNvCxnSpPr>
+            <a:stCxn id="9" idx="0"/>
+            <a:endCxn id="5" idx="2"/>
+          </p:cNvCxnSpPr>
+          <p:nvPr/>
+        </p:nvCxnSpPr>
+        <p:spPr>
+          <a:xfrm flipH="1" flipV="1">
+            <a:off x="2650054" y="1915774"/>
+            <a:ext cx="484876" cy="1111256"/>
+          </a:xfrm>
+          <a:prstGeom prst="straightConnector1">
+            <a:avLst/>
+          </a:prstGeom>
+          <a:ln w="12700" cmpd="sng">
+            <a:solidFill>
+              <a:schemeClr val="tx1"/>
+            </a:solidFill>
+            <a:headEnd type="none"/>
+            <a:tailEnd type="triangle"/>
+          </a:ln>
+          <a:effectLst/>
+        </p:spPr>
+        <p:style>
+          <a:lnRef idx="2">
+            <a:schemeClr val="accent1"/>
+          </a:lnRef>
+          <a:fillRef idx="0">
+            <a:schemeClr val="accent1"/>
+          </a:fillRef>
+          <a:effectRef idx="1">
+            <a:schemeClr val="accent1"/>
+          </a:effectRef>
+          <a:fontRef idx="minor">
+            <a:schemeClr val="tx1"/>
+          </a:fontRef>
+        </p:style>
+      </p:cxnSp>
+      <p:cxnSp>
+        <p:nvCxnSpPr>
+          <p:cNvPr id="30" name="Gerade Verbindung mit Pfeil 29"/>
+          <p:cNvCxnSpPr>
+            <a:stCxn id="9" idx="0"/>
+          </p:cNvCxnSpPr>
+          <p:nvPr/>
+        </p:nvCxnSpPr>
+        <p:spPr>
+          <a:xfrm flipV="1">
+            <a:off x="3134930" y="1175582"/>
+            <a:ext cx="632628" cy="1851448"/>
+          </a:xfrm>
+          <a:prstGeom prst="straightConnector1">
+            <a:avLst/>
+          </a:prstGeom>
+          <a:ln w="12700" cmpd="sng">
+            <a:solidFill>
+              <a:schemeClr val="tx1"/>
+            </a:solidFill>
+            <a:headEnd type="none"/>
+            <a:tailEnd type="triangle"/>
+          </a:ln>
+          <a:effectLst/>
+        </p:spPr>
+        <p:style>
+          <a:lnRef idx="2">
+            <a:schemeClr val="accent1"/>
+          </a:lnRef>
+          <a:fillRef idx="0">
+            <a:schemeClr val="accent1"/>
+          </a:fillRef>
+          <a:effectRef idx="1">
+            <a:schemeClr val="accent1"/>
+          </a:effectRef>
+          <a:fontRef idx="minor">
+            <a:schemeClr val="tx1"/>
+          </a:fontRef>
+        </p:style>
+      </p:cxnSp>
+      <p:cxnSp>
+        <p:nvCxnSpPr>
+          <p:cNvPr id="33" name="Gerade Verbindung mit Pfeil 32"/>
+          <p:cNvCxnSpPr>
+            <a:stCxn id="10" idx="0"/>
+            <a:endCxn id="8" idx="2"/>
+          </p:cNvCxnSpPr>
+          <p:nvPr/>
+        </p:nvCxnSpPr>
+        <p:spPr>
+          <a:xfrm flipV="1">
+            <a:off x="4355755" y="1921226"/>
+            <a:ext cx="0" cy="377864"/>
+          </a:xfrm>
+          <a:prstGeom prst="straightConnector1">
+            <a:avLst/>
+          </a:prstGeom>
+          <a:ln w="12700" cmpd="sng">
+            <a:solidFill>
+              <a:schemeClr val="tx1"/>
+            </a:solidFill>
+            <a:headEnd type="none"/>
+            <a:tailEnd type="triangle"/>
+          </a:ln>
+          <a:effectLst/>
+        </p:spPr>
+        <p:style>
+          <a:lnRef idx="2">
+            <a:schemeClr val="accent1"/>
+          </a:lnRef>
+          <a:fillRef idx="0">
+            <a:schemeClr val="accent1"/>
+          </a:fillRef>
+          <a:effectRef idx="1">
+            <a:schemeClr val="accent1"/>
+          </a:effectRef>
+          <a:fontRef idx="minor">
+            <a:schemeClr val="tx1"/>
+          </a:fontRef>
+        </p:style>
+      </p:cxnSp>
+      <p:cxnSp>
+        <p:nvCxnSpPr>
+          <p:cNvPr id="36" name="Gerade Verbindung mit Pfeil 35"/>
+          <p:cNvCxnSpPr>
+            <a:stCxn id="8" idx="0"/>
+            <a:endCxn id="7" idx="2"/>
+          </p:cNvCxnSpPr>
+          <p:nvPr/>
+        </p:nvCxnSpPr>
+        <p:spPr>
+          <a:xfrm flipV="1">
+            <a:off x="4355755" y="1175582"/>
+            <a:ext cx="0" cy="451748"/>
+          </a:xfrm>
+          <a:prstGeom prst="straightConnector1">
+            <a:avLst/>
+          </a:prstGeom>
+          <a:ln w="12700" cmpd="sng">
+            <a:solidFill>
+              <a:schemeClr val="tx1"/>
+            </a:solidFill>
+            <a:headEnd type="none"/>
+            <a:tailEnd type="triangle"/>
+          </a:ln>
+          <a:effectLst/>
+        </p:spPr>
+        <p:style>
+          <a:lnRef idx="2">
+            <a:schemeClr val="accent1"/>
+          </a:lnRef>
+          <a:fillRef idx="0">
+            <a:schemeClr val="accent1"/>
+          </a:fillRef>
+          <a:effectRef idx="1">
+            <a:schemeClr val="accent1"/>
+          </a:effectRef>
+          <a:fontRef idx="minor">
+            <a:schemeClr val="tx1"/>
+          </a:fontRef>
+        </p:style>
+      </p:cxnSp>
     </p:spTree>
     <p:extLst>
       <p:ext uri="{BB962C8B-B14F-4D97-AF65-F5344CB8AC3E}">

</xml_diff>